<commit_message>
Gestion des fichiers CSV avec Scilab (1ère version) MAJ documentation
</commit_message>
<xml_diff>
--- a/Documents/Illustration Papp Linky.pptx
+++ b/Documents/Illustration Papp Linky.pptx
@@ -292,7 +292,7 @@
           <a:p>
             <a:fld id="{CE3ACC41-0353-4256-99D3-4F32A261211B}" type="datetimeFigureOut">
               <a:rPr lang="fr-FR" smtClean="0"/>
-              <a:t>10/10/2013</a:t>
+              <a:t>05/12/2014</a:t>
             </a:fld>
             <a:endParaRPr lang="fr-FR"/>
           </a:p>
@@ -462,7 +462,7 @@
           <a:p>
             <a:fld id="{CE3ACC41-0353-4256-99D3-4F32A261211B}" type="datetimeFigureOut">
               <a:rPr lang="fr-FR" smtClean="0"/>
-              <a:t>10/10/2013</a:t>
+              <a:t>05/12/2014</a:t>
             </a:fld>
             <a:endParaRPr lang="fr-FR"/>
           </a:p>
@@ -642,7 +642,7 @@
           <a:p>
             <a:fld id="{CE3ACC41-0353-4256-99D3-4F32A261211B}" type="datetimeFigureOut">
               <a:rPr lang="fr-FR" smtClean="0"/>
-              <a:t>10/10/2013</a:t>
+              <a:t>05/12/2014</a:t>
             </a:fld>
             <a:endParaRPr lang="fr-FR"/>
           </a:p>
@@ -812,7 +812,7 @@
           <a:p>
             <a:fld id="{CE3ACC41-0353-4256-99D3-4F32A261211B}" type="datetimeFigureOut">
               <a:rPr lang="fr-FR" smtClean="0"/>
-              <a:t>10/10/2013</a:t>
+              <a:t>05/12/2014</a:t>
             </a:fld>
             <a:endParaRPr lang="fr-FR"/>
           </a:p>
@@ -1058,7 +1058,7 @@
           <a:p>
             <a:fld id="{CE3ACC41-0353-4256-99D3-4F32A261211B}" type="datetimeFigureOut">
               <a:rPr lang="fr-FR" smtClean="0"/>
-              <a:t>10/10/2013</a:t>
+              <a:t>05/12/2014</a:t>
             </a:fld>
             <a:endParaRPr lang="fr-FR"/>
           </a:p>
@@ -1346,7 +1346,7 @@
           <a:p>
             <a:fld id="{CE3ACC41-0353-4256-99D3-4F32A261211B}" type="datetimeFigureOut">
               <a:rPr lang="fr-FR" smtClean="0"/>
-              <a:t>10/10/2013</a:t>
+              <a:t>05/12/2014</a:t>
             </a:fld>
             <a:endParaRPr lang="fr-FR"/>
           </a:p>
@@ -1768,7 +1768,7 @@
           <a:p>
             <a:fld id="{CE3ACC41-0353-4256-99D3-4F32A261211B}" type="datetimeFigureOut">
               <a:rPr lang="fr-FR" smtClean="0"/>
-              <a:t>10/10/2013</a:t>
+              <a:t>05/12/2014</a:t>
             </a:fld>
             <a:endParaRPr lang="fr-FR"/>
           </a:p>
@@ -1886,7 +1886,7 @@
           <a:p>
             <a:fld id="{CE3ACC41-0353-4256-99D3-4F32A261211B}" type="datetimeFigureOut">
               <a:rPr lang="fr-FR" smtClean="0"/>
-              <a:t>10/10/2013</a:t>
+              <a:t>05/12/2014</a:t>
             </a:fld>
             <a:endParaRPr lang="fr-FR"/>
           </a:p>
@@ -1981,7 +1981,7 @@
           <a:p>
             <a:fld id="{CE3ACC41-0353-4256-99D3-4F32A261211B}" type="datetimeFigureOut">
               <a:rPr lang="fr-FR" smtClean="0"/>
-              <a:t>10/10/2013</a:t>
+              <a:t>05/12/2014</a:t>
             </a:fld>
             <a:endParaRPr lang="fr-FR"/>
           </a:p>
@@ -2258,7 +2258,7 @@
           <a:p>
             <a:fld id="{CE3ACC41-0353-4256-99D3-4F32A261211B}" type="datetimeFigureOut">
               <a:rPr lang="fr-FR" smtClean="0"/>
-              <a:t>10/10/2013</a:t>
+              <a:t>05/12/2014</a:t>
             </a:fld>
             <a:endParaRPr lang="fr-FR"/>
           </a:p>
@@ -2511,7 +2511,7 @@
           <a:p>
             <a:fld id="{CE3ACC41-0353-4256-99D3-4F32A261211B}" type="datetimeFigureOut">
               <a:rPr lang="fr-FR" smtClean="0"/>
-              <a:t>10/10/2013</a:t>
+              <a:t>05/12/2014</a:t>
             </a:fld>
             <a:endParaRPr lang="fr-FR"/>
           </a:p>
@@ -2724,7 +2724,7 @@
           <a:p>
             <a:fld id="{CE3ACC41-0353-4256-99D3-4F32A261211B}" type="datetimeFigureOut">
               <a:rPr lang="fr-FR" smtClean="0"/>
-              <a:t>10/10/2013</a:t>
+              <a:t>05/12/2014</a:t>
             </a:fld>
             <a:endParaRPr lang="fr-FR"/>
           </a:p>
@@ -3398,68 +3398,83 @@
           <a:lstStyle/>
           <a:p>
             <a:r>
-              <a:rPr lang="fr-FR" dirty="0" smtClean="0"/>
-              <a:t>Le compteur émet en RS232 modulée en amplitude (résolution: 1trame / 1.4s; LSB de la puissance apparente = 4W)</a:t>
-            </a:r>
-          </a:p>
-          <a:p>
-            <a:r>
-              <a:rPr lang="fr-FR" dirty="0" smtClean="0"/>
+              <a:rPr lang="fr-FR" sz="2000" dirty="0" smtClean="0"/>
+              <a:t>Le compteur émet en RS232 modulée en amplitude (résolution: 1trame / 1.4s; LSB de la puissance apparente </a:t>
+            </a:r>
+            <a:r>
+              <a:rPr lang="fr-FR" sz="2000" dirty="0" smtClean="0">
+                <a:latin typeface="Arial"/>
+                <a:cs typeface="Arial"/>
+              </a:rPr>
+              <a:t>≈</a:t>
+            </a:r>
+            <a:r>
+              <a:rPr lang="fr-FR" sz="2000" dirty="0" smtClean="0"/>
+              <a:t> </a:t>
+            </a:r>
+            <a:r>
+              <a:rPr lang="fr-FR" sz="2000" dirty="0" smtClean="0"/>
+              <a:t>4W)</a:t>
+            </a:r>
+          </a:p>
+          <a:p>
+            <a:r>
+              <a:rPr lang="fr-FR" sz="2000" dirty="0" smtClean="0"/>
               <a:t>Réception sous </a:t>
             </a:r>
             <a:r>
-              <a:rPr lang="fr-FR" dirty="0" err="1" smtClean="0"/>
+              <a:rPr lang="fr-FR" sz="2000" dirty="0" err="1" smtClean="0"/>
               <a:t>Raspberry</a:t>
             </a:r>
             <a:r>
-              <a:rPr lang="fr-FR" dirty="0" smtClean="0"/>
+              <a:rPr lang="fr-FR" sz="2000" dirty="0" smtClean="0"/>
               <a:t>-Pi</a:t>
             </a:r>
           </a:p>
           <a:p>
             <a:pPr lvl="1"/>
             <a:r>
-              <a:rPr lang="fr-FR" dirty="0" smtClean="0"/>
+              <a:rPr lang="fr-FR" sz="1800" dirty="0" smtClean="0"/>
               <a:t>Horodatage</a:t>
             </a:r>
           </a:p>
           <a:p>
             <a:pPr lvl="1"/>
             <a:r>
-              <a:rPr lang="fr-FR" dirty="0" smtClean="0"/>
+              <a:rPr lang="fr-FR" sz="1800" dirty="0" smtClean="0"/>
               <a:t>Décodage de la trame</a:t>
             </a:r>
           </a:p>
           <a:p>
             <a:pPr lvl="1"/>
             <a:r>
-              <a:rPr lang="fr-FR" dirty="0" smtClean="0"/>
+              <a:rPr lang="fr-FR" sz="1800" dirty="0" smtClean="0"/>
               <a:t>Enregistrement dans un fichier texte</a:t>
             </a:r>
           </a:p>
           <a:p>
             <a:r>
-              <a:rPr lang="fr-FR" dirty="0" smtClean="0"/>
+              <a:rPr lang="fr-FR" sz="2000" dirty="0" smtClean="0"/>
               <a:t>Récupération du fichier sous PC</a:t>
             </a:r>
           </a:p>
           <a:p>
             <a:pPr lvl="1"/>
             <a:r>
-              <a:rPr lang="fr-FR" dirty="0" smtClean="0"/>
+              <a:rPr lang="fr-FR" sz="1800" dirty="0" smtClean="0"/>
               <a:t>Post traitement avec </a:t>
             </a:r>
             <a:r>
-              <a:rPr lang="fr-FR" dirty="0" err="1" smtClean="0"/>
+              <a:rPr lang="fr-FR" sz="1800" dirty="0" err="1" smtClean="0"/>
               <a:t>Scilab</a:t>
             </a:r>
             <a:r>
-              <a:rPr lang="fr-FR" dirty="0" smtClean="0"/>
+              <a:rPr lang="fr-FR" sz="1800" dirty="0" smtClean="0"/>
               <a:t> pour tracer la courbe</a:t>
             </a:r>
           </a:p>
           <a:p>
-            <a:endParaRPr lang="fr-FR" dirty="0"/>
+            <a:endParaRPr lang="fr-FR" sz="2000" dirty="0"/>
           </a:p>
         </p:txBody>
       </p:sp>

</xml_diff>